<commit_message>
add answer for pertemuan ke 3 task
</commit_message>
<xml_diff>
--- a/Python Pertemuan ke 4 mbak nadia.pptx
+++ b/Python Pertemuan ke 4 mbak nadia.pptx
@@ -3088,7 +3088,15 @@
           <a:p>
             <a:r>
               <a:rPr lang="id-ID" dirty="0" smtClean="0"/>
-              <a:t>Python Pertemuan ke 3</a:t>
+              <a:t>Python Pertemuan </a:t>
+            </a:r>
+            <a:r>
+              <a:rPr lang="id-ID" smtClean="0"/>
+              <a:t>ke </a:t>
+            </a:r>
+            <a:r>
+              <a:rPr lang="id-ID" smtClean="0"/>
+              <a:t>4</a:t>
             </a:r>
             <a:endParaRPr lang="id-ID" dirty="0"/>
           </a:p>
@@ -3769,23 +3777,7 @@
             </a:pPr>
             <a:r>
               <a:rPr lang="id-ID" dirty="0" smtClean="0"/>
-              <a:t>lambda adalah fungsi anonim (tanpa nama</a:t>
-            </a:r>
-            <a:r>
-              <a:rPr lang="id-ID" dirty="0" smtClean="0"/>
-              <a:t>) atau anonymous function </a:t>
-            </a:r>
-            <a:r>
-              <a:rPr lang="id-ID" dirty="0" smtClean="0"/>
-              <a:t>dalam Python. Biasanya digunakan untuk fungsi </a:t>
-            </a:r>
-            <a:r>
-              <a:rPr lang="id-ID" dirty="0" smtClean="0"/>
-              <a:t>yang sederhana dan hanya </a:t>
-            </a:r>
-            <a:r>
-              <a:rPr lang="id-ID" dirty="0" smtClean="0"/>
-              <a:t>satu baris.</a:t>
+              <a:t>lambda adalah fungsi anonim (tanpa nama) atau anonymous function dalam Python. Biasanya digunakan untuk fungsi yang sederhana dan hanya satu baris.</a:t>
             </a:r>
           </a:p>
           <a:p>

</xml_diff>